<commit_message>
Korrekturen in Git Grundlagen Präsentation. Verbesserungen im Ablauf der Übungen.
</commit_message>
<xml_diff>
--- a/Präsentationen/Git Grundlagen.pptx
+++ b/Präsentationen/Git Grundlagen.pptx
@@ -2342,13 +2342,8 @@
             </a:r>
             <a:r>
               <a:rPr lang="de-DE" baseline="0" dirty="0" smtClean="0"/>
-              <a:t> bei Pfadangaben auch unter </a:t>
-            </a:r>
-            <a:r>
-              <a:rPr lang="de-DE" baseline="0" dirty="0" smtClean="0"/>
-              <a:t>Windows (gelb markiert).</a:t>
-            </a:r>
-            <a:endParaRPr lang="de-DE" baseline="0" dirty="0" smtClean="0"/>
+              <a:t> bei Pfadangaben auch unter Windows (gelb markiert).</a:t>
+            </a:r>
           </a:p>
           <a:p>
             <a:r>
@@ -2357,11 +2352,7 @@
             </a:r>
             <a:r>
               <a:rPr lang="de-DE" baseline="0" dirty="0" smtClean="0"/>
-              <a:t> ein Leerzeichen steht, muss zusätzlich alles nochmal in Anführungszeichen gesetzt werden</a:t>
-            </a:r>
-            <a:r>
-              <a:rPr lang="de-DE" baseline="0" dirty="0" smtClean="0"/>
-              <a:t>. Diese Anführungszeichen müssen </a:t>
+              <a:t> ein Leerzeichen steht, muss zusätzlich alles nochmal in Anführungszeichen gesetzt werden. Diese Anführungszeichen müssen </a:t>
             </a:r>
             <a:r>
               <a:rPr lang="de-DE" baseline="0" dirty="0" err="1" smtClean="0"/>
@@ -2371,7 +2362,6 @@
               <a:rPr lang="de-DE" baseline="0" dirty="0" smtClean="0"/>
               <a:t> werden (rot markiert).</a:t>
             </a:r>
-            <a:endParaRPr lang="de-DE" baseline="0" dirty="0" smtClean="0"/>
           </a:p>
           <a:p>
             <a:r>
@@ -2384,11 +2374,7 @@
             </a:r>
             <a:r>
               <a:rPr lang="de-DE" baseline="0" dirty="0" smtClean="0"/>
-              <a:t> </a:t>
-            </a:r>
-            <a:r>
-              <a:rPr lang="de-DE" baseline="0" dirty="0" smtClean="0"/>
-              <a:t>werden (violett markiert).</a:t>
+              <a:t> werden (violett markiert).</a:t>
             </a:r>
             <a:endParaRPr lang="de-DE" dirty="0"/>
           </a:p>
@@ -3872,13 +3858,8 @@
             </a:pPr>
             <a:r>
               <a:rPr lang="de-DE" baseline="0" dirty="0" smtClean="0"/>
-              <a:t>zurück ins Working Directory</a:t>
-            </a:r>
-            <a:r>
-              <a:rPr lang="de-DE" baseline="0" dirty="0" smtClean="0"/>
-              <a:t>.</a:t>
-            </a:r>
-            <a:endParaRPr lang="de-DE" baseline="0" dirty="0" smtClean="0"/>
+              <a:t>zurück ins Working Directory.</a:t>
+            </a:r>
           </a:p>
         </p:txBody>
       </p:sp>
@@ -5150,11 +5131,7 @@
             </a:r>
             <a:r>
               <a:rPr lang="de-DE" baseline="0" dirty="0" smtClean="0"/>
-              <a:t>-Programm gestartet</a:t>
-            </a:r>
-            <a:r>
-              <a:rPr lang="de-DE" baseline="0" dirty="0" smtClean="0"/>
-              <a:t>. In unserem Beispiel KDiff3.</a:t>
+              <a:t>-Programm gestartet. In unserem Beispiel KDiff3.</a:t>
             </a:r>
             <a:endParaRPr lang="de-DE" dirty="0"/>
           </a:p>
@@ -6057,11 +6034,7 @@
             </a:r>
             <a:r>
               <a:rPr lang="de-DE" baseline="0" dirty="0" smtClean="0"/>
-              <a:t> </a:t>
-            </a:r>
-            <a:r>
-              <a:rPr lang="de-DE" baseline="0" dirty="0" smtClean="0"/>
-              <a:t>sind eine grafische Oberfläche für </a:t>
+              <a:t> sind eine grafische Oberfläche für </a:t>
             </a:r>
             <a:r>
               <a:rPr lang="de-DE" baseline="0" dirty="0" err="1" smtClean="0"/>
@@ -6069,11 +6042,7 @@
             </a:r>
             <a:r>
               <a:rPr lang="de-DE" baseline="0" dirty="0" smtClean="0"/>
-              <a:t> und sie funktionieren </a:t>
-            </a:r>
-            <a:r>
-              <a:rPr lang="de-DE" baseline="0" dirty="0" smtClean="0"/>
-              <a:t>dank Mono auch unter Linux.</a:t>
+              <a:t> und sie funktionieren dank Mono auch unter Linux.</a:t>
             </a:r>
           </a:p>
           <a:p>
@@ -6229,11 +6198,7 @@
             </a:r>
             <a:r>
               <a:rPr lang="de-DE" baseline="0" dirty="0" smtClean="0"/>
-              <a:t> KDiff3. Es kann zwei oder drei Dateien nebeneinander anzeigen, behält die Zeilen, die gleich geblieben sind und hebt </a:t>
-            </a:r>
-            <a:r>
-              <a:rPr lang="de-DE" baseline="0" dirty="0" smtClean="0"/>
-              <a:t>die Unterschiede farblich hervor, damit man eine Entscheidung treffen kann.</a:t>
+              <a:t> KDiff3. Es kann zwei oder drei Dateien nebeneinander anzeigen, behält die Zeilen, die gleich geblieben sind und hebt die Unterschiede farblich hervor, damit man eine Entscheidung treffen kann.</a:t>
             </a:r>
           </a:p>
           <a:p>
@@ -10413,11 +10378,7 @@
           <a:p>
             <a:r>
               <a:rPr lang="de-DE" dirty="0" smtClean="0"/>
-              <a:t>Verzeichnis </a:t>
-            </a:r>
-            <a:r>
-              <a:rPr lang="de-DE" dirty="0" smtClean="0"/>
-              <a:t>anlegen</a:t>
+              <a:t>Verzeichnis anlegen</a:t>
             </a:r>
           </a:p>
           <a:p>
@@ -12440,7 +12401,16 @@
                 </a:solidFill>
                 <a:latin typeface="Source Code Pro" panose="020B0509030403020204" pitchFamily="49" charset="0"/>
               </a:rPr>
-              <a:t> --global </a:t>
+              <a:t> </a:t>
+            </a:r>
+            <a:r>
+              <a:rPr lang="de-DE" dirty="0" smtClean="0">
+                <a:solidFill>
+                  <a:srgbClr val="00B050"/>
+                </a:solidFill>
+                <a:latin typeface="Source Code Pro" panose="020B0509030403020204" pitchFamily="49" charset="0"/>
+              </a:rPr>
+              <a:t>--</a:t>
             </a:r>
             <a:r>
               <a:rPr lang="de-DE" dirty="0" err="1" smtClean="0">
@@ -12449,6 +12419,24 @@
                 </a:solidFill>
                 <a:latin typeface="Source Code Pro" panose="020B0509030403020204" pitchFamily="49" charset="0"/>
               </a:rPr>
+              <a:t>local</a:t>
+            </a:r>
+            <a:r>
+              <a:rPr lang="de-DE" dirty="0" smtClean="0">
+                <a:solidFill>
+                  <a:srgbClr val="00B050"/>
+                </a:solidFill>
+                <a:latin typeface="Source Code Pro" panose="020B0509030403020204" pitchFamily="49" charset="0"/>
+              </a:rPr>
+              <a:t> </a:t>
+            </a:r>
+            <a:r>
+              <a:rPr lang="de-DE" dirty="0" err="1" smtClean="0">
+                <a:solidFill>
+                  <a:srgbClr val="00B050"/>
+                </a:solidFill>
+                <a:latin typeface="Source Code Pro" panose="020B0509030403020204" pitchFamily="49" charset="0"/>
+              </a:rPr>
               <a:t>user.email</a:t>
             </a:r>
             <a:r>
@@ -12514,7 +12502,43 @@
                 </a:solidFill>
                 <a:latin typeface="Source Code Pro" panose="020B0509030403020204" pitchFamily="49" charset="0"/>
               </a:rPr>
-              <a:t> --global user.name "</a:t>
+              <a:t> </a:t>
+            </a:r>
+            <a:r>
+              <a:rPr lang="de-DE" dirty="0" smtClean="0">
+                <a:solidFill>
+                  <a:srgbClr val="00B050"/>
+                </a:solidFill>
+                <a:latin typeface="Source Code Pro" panose="020B0509030403020204" pitchFamily="49" charset="0"/>
+              </a:rPr>
+              <a:t>--</a:t>
+            </a:r>
+            <a:r>
+              <a:rPr lang="de-DE" dirty="0" err="1" smtClean="0">
+                <a:solidFill>
+                  <a:srgbClr val="00B050"/>
+                </a:solidFill>
+                <a:latin typeface="Source Code Pro" panose="020B0509030403020204" pitchFamily="49" charset="0"/>
+              </a:rPr>
+              <a:t>local</a:t>
+            </a:r>
+            <a:r>
+              <a:rPr lang="de-DE" dirty="0" smtClean="0">
+                <a:solidFill>
+                  <a:srgbClr val="00B050"/>
+                </a:solidFill>
+                <a:latin typeface="Source Code Pro" panose="020B0509030403020204" pitchFamily="49" charset="0"/>
+              </a:rPr>
+              <a:t> </a:t>
+            </a:r>
+            <a:r>
+              <a:rPr lang="de-DE" dirty="0" smtClean="0">
+                <a:solidFill>
+                  <a:srgbClr val="00B050"/>
+                </a:solidFill>
+                <a:latin typeface="Source Code Pro" panose="020B0509030403020204" pitchFamily="49" charset="0"/>
+              </a:rPr>
+              <a:t>user.name "</a:t>
             </a:r>
             <a:r>
               <a:rPr lang="de-DE" dirty="0" smtClean="0">
@@ -13019,16 +13043,7 @@
                 </a:solidFill>
                 <a:latin typeface="Source Code Pro" panose="020B0509030403020204" pitchFamily="49" charset="0"/>
               </a:rPr>
-              <a:t>&lt;exe</a:t>
-            </a:r>
-            <a:r>
-              <a:rPr lang="de-DE" dirty="0" smtClean="0">
-                <a:solidFill>
-                  <a:srgbClr val="00B0F0"/>
-                </a:solidFill>
-                <a:latin typeface="Source Code Pro" panose="020B0509030403020204" pitchFamily="49" charset="0"/>
-              </a:rPr>
-              <a:t>&gt;</a:t>
+              <a:t>&lt;exe&gt;</a:t>
             </a:r>
             <a:r>
               <a:rPr lang="de-DE" dirty="0" smtClean="0">
@@ -13538,16 +13553,7 @@
                 </a:solidFill>
                 <a:latin typeface="Source Code Pro" panose="020B0509030403020204" pitchFamily="49" charset="0"/>
               </a:rPr>
-              <a:t>difftool.kdiff3.path </a:t>
-            </a:r>
-            <a:r>
-              <a:rPr lang="de-DE" sz="2400" dirty="0" smtClean="0">
-                <a:solidFill>
-                  <a:srgbClr val="00B050"/>
-                </a:solidFill>
-                <a:latin typeface="Source Code Pro" panose="020B0509030403020204" pitchFamily="49" charset="0"/>
-              </a:rPr>
-              <a:t>/</a:t>
+              <a:t>difftool.kdiff3.path /</a:t>
             </a:r>
             <a:r>
               <a:rPr lang="de-DE" sz="2400" dirty="0" err="1" smtClean="0">
@@ -14394,11 +14400,11 @@
   <p:clrMapOvr>
     <a:masterClrMapping/>
   </p:clrMapOvr>
-  <mc:AlternateContent xmlns:mc="http://schemas.openxmlformats.org/markup-compatibility/2006">
-    <mc:Choice xmlns:p14="http://schemas.microsoft.com/office/powerpoint/2010/main" Requires="p14">
+  <mc:AlternateContent xmlns:mc="http://schemas.openxmlformats.org/markup-compatibility/2006" xmlns:p14="http://schemas.microsoft.com/office/powerpoint/2010/main">
+    <mc:Choice Requires="p14">
       <p:transition spd="slow" p14:dur="2000"/>
     </mc:Choice>
-    <mc:Fallback>
+    <mc:Fallback xmlns="">
       <p:transition spd="slow"/>
     </mc:Fallback>
   </mc:AlternateContent>
@@ -14509,7 +14515,6 @@
               <a:rPr lang="de-DE" dirty="0" smtClean="0"/>
               <a:t>Basisoperationen</a:t>
             </a:r>
-            <a:endParaRPr lang="de-DE" dirty="0" smtClean="0"/>
           </a:p>
         </p:txBody>
       </p:sp>
@@ -15488,6 +15493,41 @@
                 </a:solidFill>
                 <a:latin typeface="Source Code Pro" panose="020B0509030403020204" pitchFamily="49" charset="0"/>
               </a:rPr>
+              <a:t>status</a:t>
+            </a:r>
+            <a:endParaRPr lang="de-DE" dirty="0" smtClean="0">
+              <a:solidFill>
+                <a:srgbClr val="00B050"/>
+              </a:solidFill>
+              <a:latin typeface="Source Code Pro" panose="020B0509030403020204" pitchFamily="49" charset="0"/>
+            </a:endParaRPr>
+          </a:p>
+          <a:p>
+            <a:r>
+              <a:rPr lang="de-DE" dirty="0" err="1" smtClean="0">
+                <a:solidFill>
+                  <a:srgbClr val="00B050"/>
+                </a:solidFill>
+                <a:latin typeface="Source Code Pro" panose="020B0509030403020204" pitchFamily="49" charset="0"/>
+              </a:rPr>
+              <a:t>git</a:t>
+            </a:r>
+            <a:r>
+              <a:rPr lang="de-DE" dirty="0" smtClean="0">
+                <a:solidFill>
+                  <a:srgbClr val="00B050"/>
+                </a:solidFill>
+                <a:latin typeface="Source Code Pro" panose="020B0509030403020204" pitchFamily="49" charset="0"/>
+              </a:rPr>
+              <a:t> </a:t>
+            </a:r>
+            <a:r>
+              <a:rPr lang="de-DE" dirty="0" err="1" smtClean="0">
+                <a:solidFill>
+                  <a:srgbClr val="00B050"/>
+                </a:solidFill>
+                <a:latin typeface="Source Code Pro" panose="020B0509030403020204" pitchFamily="49" charset="0"/>
+              </a:rPr>
               <a:t>add</a:t>
             </a:r>
             <a:r>
@@ -15497,8 +15537,23 @@
                 </a:solidFill>
                 <a:latin typeface="Source Code Pro" panose="020B0509030403020204" pitchFamily="49" charset="0"/>
               </a:rPr>
-              <a:t> -- text.txt</a:t>
-            </a:r>
+              <a:t> -- </a:t>
+            </a:r>
+            <a:r>
+              <a:rPr lang="de-DE" dirty="0" smtClean="0">
+                <a:solidFill>
+                  <a:srgbClr val="00B050"/>
+                </a:solidFill>
+                <a:latin typeface="Source Code Pro" panose="020B0509030403020204" pitchFamily="49" charset="0"/>
+              </a:rPr>
+              <a:t>test.txt</a:t>
+            </a:r>
+            <a:endParaRPr lang="de-DE" dirty="0" smtClean="0">
+              <a:solidFill>
+                <a:srgbClr val="00B050"/>
+              </a:solidFill>
+              <a:latin typeface="Source Code Pro" panose="020B0509030403020204" pitchFamily="49" charset="0"/>
+            </a:endParaRPr>
           </a:p>
           <a:p>
             <a:r>
@@ -16140,6 +16195,52 @@
           <a:lstStyle/>
           <a:p>
             <a:r>
+              <a:rPr lang="de-DE" dirty="0" smtClean="0">
+                <a:solidFill>
+                  <a:srgbClr val="00B050"/>
+                </a:solidFill>
+                <a:latin typeface="Source Code Pro" panose="020B0509030403020204" pitchFamily="49" charset="0"/>
+              </a:rPr>
+              <a:t>echo "neu" &gt; test.txt</a:t>
+            </a:r>
+          </a:p>
+          <a:p>
+            <a:r>
+              <a:rPr lang="de-DE" dirty="0" err="1" smtClean="0">
+                <a:solidFill>
+                  <a:srgbClr val="00B050"/>
+                </a:solidFill>
+                <a:latin typeface="Source Code Pro" panose="020B0509030403020204" pitchFamily="49" charset="0"/>
+              </a:rPr>
+              <a:t>git</a:t>
+            </a:r>
+            <a:r>
+              <a:rPr lang="de-DE" dirty="0" smtClean="0">
+                <a:solidFill>
+                  <a:srgbClr val="00B050"/>
+                </a:solidFill>
+                <a:latin typeface="Source Code Pro" panose="020B0509030403020204" pitchFamily="49" charset="0"/>
+              </a:rPr>
+              <a:t> </a:t>
+            </a:r>
+            <a:r>
+              <a:rPr lang="de-DE" dirty="0" err="1" smtClean="0">
+                <a:solidFill>
+                  <a:srgbClr val="00B050"/>
+                </a:solidFill>
+                <a:latin typeface="Source Code Pro" panose="020B0509030403020204" pitchFamily="49" charset="0"/>
+              </a:rPr>
+              <a:t>status</a:t>
+            </a:r>
+            <a:endParaRPr lang="de-DE" dirty="0" smtClean="0">
+              <a:solidFill>
+                <a:srgbClr val="00B050"/>
+              </a:solidFill>
+              <a:latin typeface="Source Code Pro" panose="020B0509030403020204" pitchFamily="49" charset="0"/>
+            </a:endParaRPr>
+          </a:p>
+          <a:p>
+            <a:r>
               <a:rPr lang="de-DE" dirty="0" err="1" smtClean="0">
                 <a:solidFill>
                   <a:srgbClr val="00B050"/>
@@ -16930,13 +17031,142 @@
           <a:lstStyle/>
           <a:p>
             <a:r>
+              <a:rPr lang="de-DE" dirty="0">
+                <a:solidFill>
+                  <a:srgbClr val="00B050"/>
+                </a:solidFill>
+                <a:latin typeface="Source Code Pro" panose="020B0509030403020204" pitchFamily="49" charset="0"/>
+              </a:rPr>
+              <a:t>e</a:t>
+            </a:r>
+            <a:r>
               <a:rPr lang="de-DE" dirty="0" smtClean="0">
                 <a:solidFill>
                   <a:srgbClr val="00B050"/>
                 </a:solidFill>
                 <a:latin typeface="Source Code Pro" panose="020B0509030403020204" pitchFamily="49" charset="0"/>
               </a:rPr>
-              <a:t>echo "Änderung" &gt;&gt; test.txt</a:t>
+              <a:t>cho </a:t>
+            </a:r>
+            <a:r>
+              <a:rPr lang="de-DE" dirty="0" smtClean="0">
+                <a:solidFill>
+                  <a:srgbClr val="00B050"/>
+                </a:solidFill>
+                <a:latin typeface="Source Code Pro" panose="020B0509030403020204" pitchFamily="49" charset="0"/>
+              </a:rPr>
+              <a:t>"</a:t>
+            </a:r>
+            <a:r>
+              <a:rPr lang="de-DE" dirty="0" smtClean="0">
+                <a:solidFill>
+                  <a:srgbClr val="00B050"/>
+                </a:solidFill>
+                <a:latin typeface="Source Code Pro" panose="020B0509030403020204" pitchFamily="49" charset="0"/>
+              </a:rPr>
+              <a:t>Hallo" &gt; test.txt</a:t>
+            </a:r>
+          </a:p>
+          <a:p>
+            <a:r>
+              <a:rPr lang="de-DE" dirty="0" err="1">
+                <a:solidFill>
+                  <a:srgbClr val="00B050"/>
+                </a:solidFill>
+                <a:latin typeface="Source Code Pro" panose="020B0509030403020204" pitchFamily="49" charset="0"/>
+              </a:rPr>
+              <a:t>g</a:t>
+            </a:r>
+            <a:r>
+              <a:rPr lang="de-DE" dirty="0" err="1" smtClean="0">
+                <a:solidFill>
+                  <a:srgbClr val="00B050"/>
+                </a:solidFill>
+                <a:latin typeface="Source Code Pro" panose="020B0509030403020204" pitchFamily="49" charset="0"/>
+              </a:rPr>
+              <a:t>it</a:t>
+            </a:r>
+            <a:r>
+              <a:rPr lang="de-DE" dirty="0" smtClean="0">
+                <a:solidFill>
+                  <a:srgbClr val="00B050"/>
+                </a:solidFill>
+                <a:latin typeface="Source Code Pro" panose="020B0509030403020204" pitchFamily="49" charset="0"/>
+              </a:rPr>
+              <a:t> </a:t>
+            </a:r>
+            <a:r>
+              <a:rPr lang="de-DE" dirty="0" err="1" smtClean="0">
+                <a:solidFill>
+                  <a:srgbClr val="00B050"/>
+                </a:solidFill>
+                <a:latin typeface="Source Code Pro" panose="020B0509030403020204" pitchFamily="49" charset="0"/>
+              </a:rPr>
+              <a:t>add</a:t>
+            </a:r>
+            <a:r>
+              <a:rPr lang="de-DE" dirty="0" smtClean="0">
+                <a:solidFill>
+                  <a:srgbClr val="00B050"/>
+                </a:solidFill>
+                <a:latin typeface="Source Code Pro" panose="020B0509030403020204" pitchFamily="49" charset="0"/>
+              </a:rPr>
+              <a:t> -- test.txt</a:t>
+            </a:r>
+          </a:p>
+          <a:p>
+            <a:r>
+              <a:rPr lang="de-DE" dirty="0" err="1" smtClean="0">
+                <a:solidFill>
+                  <a:srgbClr val="00B050"/>
+                </a:solidFill>
+                <a:latin typeface="Source Code Pro" panose="020B0509030403020204" pitchFamily="49" charset="0"/>
+              </a:rPr>
+              <a:t>git</a:t>
+            </a:r>
+            <a:r>
+              <a:rPr lang="de-DE" dirty="0" smtClean="0">
+                <a:solidFill>
+                  <a:srgbClr val="00B050"/>
+                </a:solidFill>
+                <a:latin typeface="Source Code Pro" panose="020B0509030403020204" pitchFamily="49" charset="0"/>
+              </a:rPr>
+              <a:t> </a:t>
+            </a:r>
+            <a:r>
+              <a:rPr lang="de-DE" dirty="0" err="1" smtClean="0">
+                <a:solidFill>
+                  <a:srgbClr val="00B050"/>
+                </a:solidFill>
+                <a:latin typeface="Source Code Pro" panose="020B0509030403020204" pitchFamily="49" charset="0"/>
+              </a:rPr>
+              <a:t>status</a:t>
+            </a:r>
+            <a:endParaRPr lang="de-DE" dirty="0" smtClean="0">
+              <a:solidFill>
+                <a:srgbClr val="00B050"/>
+              </a:solidFill>
+              <a:latin typeface="Source Code Pro" panose="020B0509030403020204" pitchFamily="49" charset="0"/>
+            </a:endParaRPr>
+          </a:p>
+          <a:p>
+            <a:r>
+              <a:rPr lang="de-DE" dirty="0" smtClean="0">
+                <a:solidFill>
+                  <a:srgbClr val="00B050"/>
+                </a:solidFill>
+                <a:latin typeface="Source Code Pro" panose="020B0509030403020204" pitchFamily="49" charset="0"/>
+              </a:rPr>
+              <a:t>echo "neu" &gt; </a:t>
+            </a:r>
+            <a:r>
+              <a:rPr lang="de-DE" dirty="0" smtClean="0">
+                <a:solidFill>
+                  <a:srgbClr val="00B050"/>
+                </a:solidFill>
+                <a:latin typeface="Source Code Pro" panose="020B0509030403020204" pitchFamily="49" charset="0"/>
+              </a:rPr>
+              <a:t>test.txt</a:t>
             </a:r>
           </a:p>
           <a:p>
@@ -17908,7 +18138,16 @@
                 </a:solidFill>
                 <a:latin typeface="Source Code Pro" panose="020B0509030403020204" pitchFamily="49" charset="0"/>
               </a:rPr>
-              <a:t>echo "A" &gt; test.txt</a:t>
+              <a:t>echo "A" &gt; </a:t>
+            </a:r>
+            <a:r>
+              <a:rPr lang="de-DE" dirty="0" smtClean="0">
+                <a:solidFill>
+                  <a:srgbClr val="00B050"/>
+                </a:solidFill>
+                <a:latin typeface="Source Code Pro" panose="020B0509030403020204" pitchFamily="49" charset="0"/>
+              </a:rPr>
+              <a:t>test.txt</a:t>
             </a:r>
           </a:p>
           <a:p>
@@ -17937,6 +18176,41 @@
                 </a:solidFill>
                 <a:latin typeface="Source Code Pro" panose="020B0509030403020204" pitchFamily="49" charset="0"/>
               </a:rPr>
+              <a:t>status</a:t>
+            </a:r>
+            <a:endParaRPr lang="de-DE" dirty="0" smtClean="0">
+              <a:solidFill>
+                <a:srgbClr val="00B050"/>
+              </a:solidFill>
+              <a:latin typeface="Source Code Pro" panose="020B0509030403020204" pitchFamily="49" charset="0"/>
+            </a:endParaRPr>
+          </a:p>
+          <a:p>
+            <a:r>
+              <a:rPr lang="de-DE" dirty="0" err="1" smtClean="0">
+                <a:solidFill>
+                  <a:srgbClr val="00B050"/>
+                </a:solidFill>
+                <a:latin typeface="Source Code Pro" panose="020B0509030403020204" pitchFamily="49" charset="0"/>
+              </a:rPr>
+              <a:t>git</a:t>
+            </a:r>
+            <a:r>
+              <a:rPr lang="de-DE" dirty="0" smtClean="0">
+                <a:solidFill>
+                  <a:srgbClr val="00B050"/>
+                </a:solidFill>
+                <a:latin typeface="Source Code Pro" panose="020B0509030403020204" pitchFamily="49" charset="0"/>
+              </a:rPr>
+              <a:t> </a:t>
+            </a:r>
+            <a:r>
+              <a:rPr lang="de-DE" dirty="0" err="1" smtClean="0">
+                <a:solidFill>
+                  <a:srgbClr val="00B050"/>
+                </a:solidFill>
+                <a:latin typeface="Source Code Pro" panose="020B0509030403020204" pitchFamily="49" charset="0"/>
+              </a:rPr>
               <a:t>add</a:t>
             </a:r>
             <a:r>
@@ -17946,7 +18220,16 @@
                 </a:solidFill>
                 <a:latin typeface="Source Code Pro" panose="020B0509030403020204" pitchFamily="49" charset="0"/>
               </a:rPr>
-              <a:t> -- test.txt</a:t>
+              <a:t> -- </a:t>
+            </a:r>
+            <a:r>
+              <a:rPr lang="de-DE" dirty="0" smtClean="0">
+                <a:solidFill>
+                  <a:srgbClr val="00B050"/>
+                </a:solidFill>
+                <a:latin typeface="Source Code Pro" panose="020B0509030403020204" pitchFamily="49" charset="0"/>
+              </a:rPr>
+              <a:t>test.txt</a:t>
             </a:r>
           </a:p>
           <a:p>
@@ -17975,7 +18258,77 @@
                 </a:solidFill>
                 <a:latin typeface="Source Code Pro" panose="020B0509030403020204" pitchFamily="49" charset="0"/>
               </a:rPr>
+              <a:t>status</a:t>
+            </a:r>
+            <a:endParaRPr lang="de-DE" dirty="0" smtClean="0">
+              <a:solidFill>
+                <a:srgbClr val="00B050"/>
+              </a:solidFill>
+              <a:latin typeface="Source Code Pro" panose="020B0509030403020204" pitchFamily="49" charset="0"/>
+            </a:endParaRPr>
+          </a:p>
+          <a:p>
+            <a:r>
+              <a:rPr lang="de-DE" dirty="0" err="1" smtClean="0">
+                <a:solidFill>
+                  <a:srgbClr val="00B050"/>
+                </a:solidFill>
+                <a:latin typeface="Source Code Pro" panose="020B0509030403020204" pitchFamily="49" charset="0"/>
+              </a:rPr>
+              <a:t>git</a:t>
+            </a:r>
+            <a:r>
+              <a:rPr lang="de-DE" dirty="0" smtClean="0">
+                <a:solidFill>
+                  <a:srgbClr val="00B050"/>
+                </a:solidFill>
+                <a:latin typeface="Source Code Pro" panose="020B0509030403020204" pitchFamily="49" charset="0"/>
+              </a:rPr>
+              <a:t> </a:t>
+            </a:r>
+            <a:r>
+              <a:rPr lang="de-DE" dirty="0" err="1" smtClean="0">
+                <a:solidFill>
+                  <a:srgbClr val="00B050"/>
+                </a:solidFill>
+                <a:latin typeface="Source Code Pro" panose="020B0509030403020204" pitchFamily="49" charset="0"/>
+              </a:rPr>
               <a:t>commit</a:t>
+            </a:r>
+            <a:endParaRPr lang="de-DE" dirty="0" smtClean="0">
+              <a:solidFill>
+                <a:srgbClr val="00B050"/>
+              </a:solidFill>
+              <a:latin typeface="Source Code Pro" panose="020B0509030403020204" pitchFamily="49" charset="0"/>
+            </a:endParaRPr>
+          </a:p>
+          <a:p>
+            <a:r>
+              <a:rPr lang="de-DE" dirty="0" err="1" smtClean="0">
+                <a:solidFill>
+                  <a:srgbClr val="00B050"/>
+                </a:solidFill>
+                <a:latin typeface="Source Code Pro" panose="020B0509030403020204" pitchFamily="49" charset="0"/>
+              </a:rPr>
+              <a:t>git</a:t>
+            </a:r>
+            <a:r>
+              <a:rPr lang="de-DE" dirty="0" smtClean="0">
+                <a:solidFill>
+                  <a:srgbClr val="00B050"/>
+                </a:solidFill>
+                <a:latin typeface="Source Code Pro" panose="020B0509030403020204" pitchFamily="49" charset="0"/>
+              </a:rPr>
+              <a:t> </a:t>
+            </a:r>
+            <a:r>
+              <a:rPr lang="de-DE" dirty="0" err="1" smtClean="0">
+                <a:solidFill>
+                  <a:srgbClr val="00B050"/>
+                </a:solidFill>
+                <a:latin typeface="Source Code Pro" panose="020B0509030403020204" pitchFamily="49" charset="0"/>
+              </a:rPr>
+              <a:t>status</a:t>
             </a:r>
             <a:endParaRPr lang="de-DE" dirty="0">
               <a:solidFill>
@@ -18286,7 +18639,6 @@
               <a:rPr lang="de-DE" dirty="0"/>
               <a:t>Was wird an den Server übertragen?</a:t>
             </a:r>
-            <a:endParaRPr lang="de-DE" dirty="0"/>
           </a:p>
           <a:p>
             <a:endParaRPr lang="de-DE" dirty="0">
@@ -26505,7 +26857,16 @@
                 </a:solidFill>
                 <a:latin typeface="Source Code Pro" panose="020B0509030403020204" pitchFamily="49" charset="0"/>
               </a:rPr>
-              <a:t> push</a:t>
+              <a:t> </a:t>
+            </a:r>
+            <a:r>
+              <a:rPr lang="de-DE" dirty="0" err="1">
+                <a:solidFill>
+                  <a:srgbClr val="00B050"/>
+                </a:solidFill>
+                <a:latin typeface="Source Code Pro" panose="020B0509030403020204" pitchFamily="49" charset="0"/>
+              </a:rPr>
+              <a:t>clone</a:t>
             </a:r>
             <a:endParaRPr lang="de-DE" dirty="0">
               <a:solidFill>
@@ -26517,7 +26878,7 @@
           <a:p>
             <a:pPr lvl="1"/>
             <a:r>
-              <a:rPr lang="de-DE" dirty="0" err="1">
+              <a:rPr lang="de-DE" dirty="0" err="1" smtClean="0">
                 <a:solidFill>
                   <a:srgbClr val="00B050"/>
                 </a:solidFill>
@@ -26526,7 +26887,28 @@
               <a:t>git</a:t>
             </a:r>
             <a:r>
-              <a:rPr lang="de-DE" dirty="0">
+              <a:rPr lang="de-DE" dirty="0" smtClean="0">
+                <a:solidFill>
+                  <a:srgbClr val="00B050"/>
+                </a:solidFill>
+                <a:latin typeface="Source Code Pro" panose="020B0509030403020204" pitchFamily="49" charset="0"/>
+              </a:rPr>
+              <a:t> push</a:t>
+            </a:r>
+          </a:p>
+          <a:p>
+            <a:pPr lvl="1"/>
+            <a:r>
+              <a:rPr lang="de-DE" dirty="0" err="1" smtClean="0">
+                <a:solidFill>
+                  <a:srgbClr val="00B050"/>
+                </a:solidFill>
+                <a:latin typeface="Source Code Pro" panose="020B0509030403020204" pitchFamily="49" charset="0"/>
+              </a:rPr>
+              <a:t>git</a:t>
+            </a:r>
+            <a:r>
+              <a:rPr lang="de-DE" dirty="0" smtClean="0">
                 <a:solidFill>
                   <a:srgbClr val="00B050"/>
                 </a:solidFill>
@@ -28914,7 +29296,6 @@
               <a:rPr lang="de-DE" dirty="0" smtClean="0"/>
               <a:t>Tool zum Vergleichen von Source Code</a:t>
             </a:r>
-            <a:endParaRPr lang="de-DE" dirty="0" smtClean="0"/>
           </a:p>
           <a:p>
             <a:pPr lvl="1"/>

</xml_diff>